<commit_message>
GAW background animation 1.0
</commit_message>
<xml_diff>
--- a/Games/GameAndWatch/Images Editor.pptx
+++ b/Games/GameAndWatch/Images Editor.pptx
@@ -452,7 +452,7 @@
           <a:p>
             <a:fld id="{AA2D5501-9F36-4C3E-97D7-8E8C40C7925C}" type="datetimeFigureOut">
               <a:rPr lang="he-IL" smtClean="0"/>
-              <a:t>ט"ז/טבת/תשפ"ג</a:t>
+              <a:t>י"ח/טבת/תשפ"ג</a:t>
             </a:fld>
             <a:endParaRPr lang="he-IL"/>
           </a:p>
@@ -1540,7 +1540,7 @@
           <a:p>
             <a:fld id="{AA2D5501-9F36-4C3E-97D7-8E8C40C7925C}" type="datetimeFigureOut">
               <a:rPr lang="he-IL" smtClean="0"/>
-              <a:t>ט"ז/טבת/תשפ"ג</a:t>
+              <a:t>י"ח/טבת/תשפ"ג</a:t>
             </a:fld>
             <a:endParaRPr lang="he-IL"/>
           </a:p>
@@ -2520,7 +2520,7 @@
           <a:p>
             <a:fld id="{AA2D5501-9F36-4C3E-97D7-8E8C40C7925C}" type="datetimeFigureOut">
               <a:rPr lang="he-IL" smtClean="0"/>
-              <a:t>ט"ז/טבת/תשפ"ג</a:t>
+              <a:t>י"ח/טבת/תשפ"ג</a:t>
             </a:fld>
             <a:endParaRPr lang="he-IL"/>
           </a:p>
@@ -3654,7 +3654,7 @@
           <a:p>
             <a:fld id="{AA2D5501-9F36-4C3E-97D7-8E8C40C7925C}" type="datetimeFigureOut">
               <a:rPr lang="he-IL" smtClean="0"/>
-              <a:t>ט"ז/טבת/תשפ"ג</a:t>
+              <a:t>י"ח/טבת/תשפ"ג</a:t>
             </a:fld>
             <a:endParaRPr lang="he-IL"/>
           </a:p>
@@ -4687,7 +4687,7 @@
           <a:p>
             <a:fld id="{AA2D5501-9F36-4C3E-97D7-8E8C40C7925C}" type="datetimeFigureOut">
               <a:rPr lang="he-IL" smtClean="0"/>
-              <a:t>ט"ז/טבת/תשפ"ג</a:t>
+              <a:t>י"ח/טבת/תשפ"ג</a:t>
             </a:fld>
             <a:endParaRPr lang="he-IL"/>
           </a:p>
@@ -5347,7 +5347,7 @@
           <a:p>
             <a:fld id="{AA2D5501-9F36-4C3E-97D7-8E8C40C7925C}" type="datetimeFigureOut">
               <a:rPr lang="he-IL" smtClean="0"/>
-              <a:t>ט"ז/טבת/תשפ"ג</a:t>
+              <a:t>י"ח/טבת/תשפ"ג</a:t>
             </a:fld>
             <a:endParaRPr lang="he-IL"/>
           </a:p>
@@ -6208,7 +6208,7 @@
           <a:p>
             <a:fld id="{AA2D5501-9F36-4C3E-97D7-8E8C40C7925C}" type="datetimeFigureOut">
               <a:rPr lang="he-IL" smtClean="0"/>
-              <a:t>ט"ז/טבת/תשפ"ג</a:t>
+              <a:t>י"ח/טבת/תשפ"ג</a:t>
             </a:fld>
             <a:endParaRPr lang="he-IL"/>
           </a:p>
@@ -6398,7 +6398,7 @@
           <a:p>
             <a:fld id="{AA2D5501-9F36-4C3E-97D7-8E8C40C7925C}" type="datetimeFigureOut">
               <a:rPr lang="he-IL" smtClean="0"/>
-              <a:t>ט"ז/טבת/תשפ"ג</a:t>
+              <a:t>י"ח/טבת/תשפ"ג</a:t>
             </a:fld>
             <a:endParaRPr lang="he-IL"/>
           </a:p>
@@ -7370,7 +7370,7 @@
           <a:p>
             <a:fld id="{AA2D5501-9F36-4C3E-97D7-8E8C40C7925C}" type="datetimeFigureOut">
               <a:rPr lang="he-IL" smtClean="0"/>
-              <a:t>ט"ז/טבת/תשפ"ג</a:t>
+              <a:t>י"ח/טבת/תשפ"ג</a:t>
             </a:fld>
             <a:endParaRPr lang="he-IL"/>
           </a:p>
@@ -7581,7 +7581,7 @@
           <a:p>
             <a:fld id="{AA2D5501-9F36-4C3E-97D7-8E8C40C7925C}" type="datetimeFigureOut">
               <a:rPr lang="he-IL" smtClean="0"/>
-              <a:t>ט"ז/טבת/תשפ"ג</a:t>
+              <a:t>י"ח/טבת/תשפ"ג</a:t>
             </a:fld>
             <a:endParaRPr lang="he-IL"/>
           </a:p>
@@ -8615,7 +8615,7 @@
           <a:p>
             <a:fld id="{AA2D5501-9F36-4C3E-97D7-8E8C40C7925C}" type="datetimeFigureOut">
               <a:rPr lang="he-IL" smtClean="0"/>
-              <a:t>ט"ז/טבת/תשפ"ג</a:t>
+              <a:t>י"ח/טבת/תשפ"ג</a:t>
             </a:fld>
             <a:endParaRPr lang="he-IL"/>
           </a:p>
@@ -8887,7 +8887,7 @@
           <a:p>
             <a:fld id="{AA2D5501-9F36-4C3E-97D7-8E8C40C7925C}" type="datetimeFigureOut">
               <a:rPr lang="he-IL" smtClean="0"/>
-              <a:t>ט"ז/טבת/תשפ"ג</a:t>
+              <a:t>י"ח/טבת/תשפ"ג</a:t>
             </a:fld>
             <a:endParaRPr lang="he-IL"/>
           </a:p>
@@ -9297,7 +9297,7 @@
           <a:p>
             <a:fld id="{AA2D5501-9F36-4C3E-97D7-8E8C40C7925C}" type="datetimeFigureOut">
               <a:rPr lang="he-IL" smtClean="0"/>
-              <a:t>ט"ז/טבת/תשפ"ג</a:t>
+              <a:t>י"ח/טבת/תשפ"ג</a:t>
             </a:fld>
             <a:endParaRPr lang="he-IL"/>
           </a:p>
@@ -9424,7 +9424,7 @@
           <a:p>
             <a:fld id="{AA2D5501-9F36-4C3E-97D7-8E8C40C7925C}" type="datetimeFigureOut">
               <a:rPr lang="he-IL" smtClean="0"/>
-              <a:t>ט"ז/טבת/תשפ"ג</a:t>
+              <a:t>י"ח/טבת/תשפ"ג</a:t>
             </a:fld>
             <a:endParaRPr lang="he-IL"/>
           </a:p>
@@ -9519,7 +9519,7 @@
           <a:p>
             <a:fld id="{AA2D5501-9F36-4C3E-97D7-8E8C40C7925C}" type="datetimeFigureOut">
               <a:rPr lang="he-IL" smtClean="0"/>
-              <a:t>ט"ז/טבת/תשפ"ג</a:t>
+              <a:t>י"ח/טבת/תשפ"ג</a:t>
             </a:fld>
             <a:endParaRPr lang="he-IL"/>
           </a:p>
@@ -10600,7 +10600,7 @@
           <a:p>
             <a:fld id="{AA2D5501-9F36-4C3E-97D7-8E8C40C7925C}" type="datetimeFigureOut">
               <a:rPr lang="he-IL" smtClean="0"/>
-              <a:t>ט"ז/טבת/תשפ"ג</a:t>
+              <a:t>י"ח/טבת/תשפ"ג</a:t>
             </a:fld>
             <a:endParaRPr lang="he-IL"/>
           </a:p>
@@ -11708,7 +11708,7 @@
           <a:p>
             <a:fld id="{AA2D5501-9F36-4C3E-97D7-8E8C40C7925C}" type="datetimeFigureOut">
               <a:rPr lang="he-IL" smtClean="0"/>
-              <a:t>ט"ז/טבת/תשפ"ג</a:t>
+              <a:t>י"ח/טבת/תשפ"ג</a:t>
             </a:fld>
             <a:endParaRPr lang="he-IL"/>
           </a:p>
@@ -12705,7 +12705,7 @@
           <a:p>
             <a:fld id="{AA2D5501-9F36-4C3E-97D7-8E8C40C7925C}" type="datetimeFigureOut">
               <a:rPr lang="he-IL" smtClean="0"/>
-              <a:t>ט"ז/טבת/תשפ"ג</a:t>
+              <a:t>י"ח/טבת/תשפ"ג</a:t>
             </a:fld>
             <a:endParaRPr lang="he-IL"/>
           </a:p>
@@ -14040,13 +14040,13 @@
               </a:ext>
             </a:extLst>
           </a:blip>
-          <a:srcRect l="36003" t="30276" r="47886" b="44337"/>
+          <a:srcRect l="36809" t="30276" r="47886" b="44337"/>
           <a:stretch/>
         </p:blipFill>
         <p:spPr>
           <a:xfrm>
-            <a:off x="-37516" y="1870043"/>
-            <a:ext cx="3357491" cy="2040776"/>
+            <a:off x="130629" y="1870043"/>
+            <a:ext cx="3189346" cy="2040776"/>
           </a:xfrm>
           <a:prstGeom prst="rect">
             <a:avLst/>
@@ -14189,13 +14189,13 @@
               </a:ext>
             </a:extLst>
           </a:blip>
-          <a:srcRect l="36003" t="30276" r="47886" b="44337"/>
+          <a:srcRect l="37372" t="30276" r="47886" b="44337"/>
           <a:stretch/>
         </p:blipFill>
         <p:spPr>
           <a:xfrm>
-            <a:off x="-79719" y="2016369"/>
-            <a:ext cx="3463071" cy="1819085"/>
+            <a:off x="214604" y="2016369"/>
+            <a:ext cx="3168748" cy="1819085"/>
           </a:xfrm>
           <a:prstGeom prst="rect">
             <a:avLst/>

</xml_diff>